<commit_message>
Added PPT For Workshop
</commit_message>
<xml_diff>
--- a/Flutter Workshop.pptx
+++ b/Flutter Workshop.pptx
@@ -12,6 +12,8 @@
     <p:sldId id="260" r:id="rId6"/>
     <p:sldId id="261" r:id="rId7"/>
     <p:sldId id="262" r:id="rId8"/>
+    <p:sldId id="263" r:id="rId9"/>
+    <p:sldId id="264" r:id="rId10"/>
   </p:sldIdLst>
   <p:sldSz cx="12192000" cy="6858000"/>
   <p:notesSz cx="6858000" cy="9144000"/>
@@ -7424,6 +7426,293 @@
 </p:sld>
 </file>
 
+<file path=ppt/slides/slide8.xml><?xml version="1.0" encoding="utf-8"?>
+<p:sld xmlns:a="http://schemas.openxmlformats.org/drawingml/2006/main" xmlns:r="http://schemas.openxmlformats.org/officeDocument/2006/relationships" xmlns:p="http://schemas.openxmlformats.org/presentationml/2006/main">
+  <p:cSld>
+    <p:spTree>
+      <p:nvGrpSpPr>
+        <p:cNvPr id="1" name=""/>
+        <p:cNvGrpSpPr/>
+        <p:nvPr/>
+      </p:nvGrpSpPr>
+      <p:grpSpPr>
+        <a:xfrm>
+          <a:off x="0" y="0"/>
+          <a:ext cx="0" cy="0"/>
+          <a:chOff x="0" y="0"/>
+          <a:chExt cx="0" cy="0"/>
+        </a:xfrm>
+      </p:grpSpPr>
+      <p:sp>
+        <p:nvSpPr>
+          <p:cNvPr id="2" name="Title 1">
+            <a:extLst>
+              <a:ext uri="{FF2B5EF4-FFF2-40B4-BE49-F238E27FC236}">
+                <a16:creationId xmlns:a16="http://schemas.microsoft.com/office/drawing/2014/main" id="{632C444E-F7F5-914A-92EB-9EADBCCF5189}"/>
+              </a:ext>
+            </a:extLst>
+          </p:cNvPr>
+          <p:cNvSpPr>
+            <a:spLocks noGrp="1"/>
+          </p:cNvSpPr>
+          <p:nvPr>
+            <p:ph type="title"/>
+          </p:nvPr>
+        </p:nvSpPr>
+        <p:spPr/>
+        <p:txBody>
+          <a:bodyPr/>
+          <a:lstStyle/>
+          <a:p>
+            <a:r>
+              <a:rPr lang="en-US" dirty="0"/>
+              <a:t>What are widgets?</a:t>
+            </a:r>
+          </a:p>
+        </p:txBody>
+      </p:sp>
+      <p:sp>
+        <p:nvSpPr>
+          <p:cNvPr id="3" name="Content Placeholder 2">
+            <a:extLst>
+              <a:ext uri="{FF2B5EF4-FFF2-40B4-BE49-F238E27FC236}">
+                <a16:creationId xmlns:a16="http://schemas.microsoft.com/office/drawing/2014/main" id="{ACF81D5A-65C2-BB4B-95B4-71AAD27A4F39}"/>
+              </a:ext>
+            </a:extLst>
+          </p:cNvPr>
+          <p:cNvSpPr>
+            <a:spLocks noGrp="1"/>
+          </p:cNvSpPr>
+          <p:nvPr>
+            <p:ph idx="1"/>
+          </p:nvPr>
+        </p:nvSpPr>
+        <p:spPr/>
+        <p:txBody>
+          <a:bodyPr/>
+          <a:lstStyle/>
+          <a:p>
+            <a:r>
+              <a:rPr lang="en-IN" dirty="0"/>
+              <a:t>Flutter widgets are built using a modern framework that takes inspiration from </a:t>
+            </a:r>
+            <a:r>
+              <a:rPr lang="en-IN" dirty="0">
+                <a:hlinkClick r:id="rId2"/>
+              </a:rPr>
+              <a:t>React</a:t>
+            </a:r>
+            <a:r>
+              <a:rPr lang="en-IN" dirty="0"/>
+              <a:t>. The central idea is that you build your UI out of widgets. </a:t>
+            </a:r>
+          </a:p>
+          <a:p>
+            <a:endParaRPr lang="en-IN" dirty="0"/>
+          </a:p>
+          <a:p>
+            <a:r>
+              <a:rPr lang="en-IN" dirty="0"/>
+              <a:t>Widgets describe what their view should look like given their current configuration and state. When a widget’s state changes, the widget rebuilds its description</a:t>
+            </a:r>
+            <a:endParaRPr lang="en-US" dirty="0"/>
+          </a:p>
+        </p:txBody>
+      </p:sp>
+    </p:spTree>
+    <p:extLst>
+      <p:ext uri="{BB962C8B-B14F-4D97-AF65-F5344CB8AC3E}">
+        <p14:creationId xmlns:p14="http://schemas.microsoft.com/office/powerpoint/2010/main" val="402986338"/>
+      </p:ext>
+    </p:extLst>
+  </p:cSld>
+  <p:clrMapOvr>
+    <a:masterClrMapping/>
+  </p:clrMapOvr>
+</p:sld>
+</file>
+
+<file path=ppt/slides/slide9.xml><?xml version="1.0" encoding="utf-8"?>
+<p:sld xmlns:a="http://schemas.openxmlformats.org/drawingml/2006/main" xmlns:r="http://schemas.openxmlformats.org/officeDocument/2006/relationships" xmlns:p="http://schemas.openxmlformats.org/presentationml/2006/main">
+  <p:cSld>
+    <p:spTree>
+      <p:nvGrpSpPr>
+        <p:cNvPr id="1" name=""/>
+        <p:cNvGrpSpPr/>
+        <p:nvPr/>
+      </p:nvGrpSpPr>
+      <p:grpSpPr>
+        <a:xfrm>
+          <a:off x="0" y="0"/>
+          <a:ext cx="0" cy="0"/>
+          <a:chOff x="0" y="0"/>
+          <a:chExt cx="0" cy="0"/>
+        </a:xfrm>
+      </p:grpSpPr>
+      <p:pic>
+        <p:nvPicPr>
+          <p:cNvPr id="1026" name="Picture 2">
+            <a:extLst>
+              <a:ext uri="{FF2B5EF4-FFF2-40B4-BE49-F238E27FC236}">
+                <a16:creationId xmlns:a16="http://schemas.microsoft.com/office/drawing/2014/main" id="{A36C8958-B7D5-F644-833C-660B1E3C74B4}"/>
+              </a:ext>
+            </a:extLst>
+          </p:cNvPr>
+          <p:cNvPicPr>
+            <a:picLocks noChangeAspect="1" noChangeArrowheads="1"/>
+          </p:cNvPicPr>
+          <p:nvPr/>
+        </p:nvPicPr>
+        <p:blipFill>
+          <a:blip r:embed="rId2">
+            <a:extLst>
+              <a:ext uri="{28A0092B-C50C-407E-A947-70E740481C1C}">
+                <a14:useLocalDpi xmlns:a14="http://schemas.microsoft.com/office/drawing/2010/main" val="0"/>
+              </a:ext>
+            </a:extLst>
+          </a:blip>
+          <a:srcRect/>
+          <a:stretch>
+            <a:fillRect/>
+          </a:stretch>
+        </p:blipFill>
+        <p:spPr bwMode="auto">
+          <a:xfrm>
+            <a:off x="3049852" y="169334"/>
+            <a:ext cx="6092296" cy="4884692"/>
+          </a:xfrm>
+          <a:prstGeom prst="rect">
+            <a:avLst/>
+          </a:prstGeom>
+          <a:noFill/>
+          <a:extLst>
+            <a:ext uri="{909E8E84-426E-40DD-AFC4-6F175D3DCCD1}">
+              <a14:hiddenFill xmlns:a14="http://schemas.microsoft.com/office/drawing/2010/main">
+                <a:solidFill>
+                  <a:srgbClr val="FFFFFF"/>
+                </a:solidFill>
+              </a14:hiddenFill>
+            </a:ext>
+          </a:extLst>
+        </p:spPr>
+      </p:pic>
+      <p:sp>
+        <p:nvSpPr>
+          <p:cNvPr id="4" name="TextBox 3">
+            <a:extLst>
+              <a:ext uri="{FF2B5EF4-FFF2-40B4-BE49-F238E27FC236}">
+                <a16:creationId xmlns:a16="http://schemas.microsoft.com/office/drawing/2014/main" id="{45F8C4E1-0CA6-6548-981C-7522268A887B}"/>
+              </a:ext>
+            </a:extLst>
+          </p:cNvPr>
+          <p:cNvSpPr txBox="1"/>
+          <p:nvPr/>
+        </p:nvSpPr>
+        <p:spPr>
+          <a:xfrm>
+            <a:off x="2975504" y="5269004"/>
+            <a:ext cx="2133600" cy="1200329"/>
+          </a:xfrm>
+          <a:prstGeom prst="rect">
+            <a:avLst/>
+          </a:prstGeom>
+          <a:noFill/>
+        </p:spPr>
+        <p:txBody>
+          <a:bodyPr wrap="square" rtlCol="0">
+            <a:spAutoFit/>
+          </a:bodyPr>
+          <a:lstStyle/>
+          <a:p>
+            <a:pPr algn="ctr"/>
+            <a:r>
+              <a:rPr lang="en-US" dirty="0"/>
+              <a:t>Cannot be updated on user interaction</a:t>
+            </a:r>
+          </a:p>
+          <a:p>
+            <a:pPr algn="ctr"/>
+            <a:endParaRPr lang="en-US" dirty="0"/>
+          </a:p>
+          <a:p>
+            <a:pPr algn="ctr"/>
+            <a:r>
+              <a:rPr lang="en-US" dirty="0"/>
+              <a:t>Shortcut - </a:t>
+            </a:r>
+            <a:r>
+              <a:rPr lang="en-US" dirty="0" err="1"/>
+              <a:t>stl</a:t>
+            </a:r>
+            <a:endParaRPr lang="en-US" dirty="0"/>
+          </a:p>
+        </p:txBody>
+      </p:sp>
+      <p:sp>
+        <p:nvSpPr>
+          <p:cNvPr id="6" name="TextBox 5">
+            <a:extLst>
+              <a:ext uri="{FF2B5EF4-FFF2-40B4-BE49-F238E27FC236}">
+                <a16:creationId xmlns:a16="http://schemas.microsoft.com/office/drawing/2014/main" id="{E042E13C-520D-1347-9797-6EF54AF4D4E4}"/>
+              </a:ext>
+            </a:extLst>
+          </p:cNvPr>
+          <p:cNvSpPr txBox="1"/>
+          <p:nvPr/>
+        </p:nvSpPr>
+        <p:spPr>
+          <a:xfrm>
+            <a:off x="5892800" y="5269003"/>
+            <a:ext cx="2133600" cy="1200329"/>
+          </a:xfrm>
+          <a:prstGeom prst="rect">
+            <a:avLst/>
+          </a:prstGeom>
+          <a:noFill/>
+        </p:spPr>
+        <p:txBody>
+          <a:bodyPr wrap="square" rtlCol="0">
+            <a:spAutoFit/>
+          </a:bodyPr>
+          <a:lstStyle/>
+          <a:p>
+            <a:pPr algn="ctr"/>
+            <a:r>
+              <a:rPr lang="en-US" dirty="0"/>
+              <a:t>Can be updated on user interaction</a:t>
+            </a:r>
+          </a:p>
+          <a:p>
+            <a:pPr algn="ctr"/>
+            <a:endParaRPr lang="en-US" dirty="0"/>
+          </a:p>
+          <a:p>
+            <a:pPr algn="ctr"/>
+            <a:r>
+              <a:rPr lang="en-US" dirty="0"/>
+              <a:t>Shortcut - </a:t>
+            </a:r>
+            <a:r>
+              <a:rPr lang="en-US" dirty="0" err="1"/>
+              <a:t>stf</a:t>
+            </a:r>
+            <a:endParaRPr lang="en-US" dirty="0"/>
+          </a:p>
+        </p:txBody>
+      </p:sp>
+    </p:spTree>
+    <p:extLst>
+      <p:ext uri="{BB962C8B-B14F-4D97-AF65-F5344CB8AC3E}">
+        <p14:creationId xmlns:p14="http://schemas.microsoft.com/office/powerpoint/2010/main" val="2335687602"/>
+      </p:ext>
+    </p:extLst>
+  </p:cSld>
+  <p:clrMapOvr>
+    <a:masterClrMapping/>
+  </p:clrMapOvr>
+</p:sld>
+</file>
+
 <file path=ppt/theme/theme1.xml><?xml version="1.0" encoding="utf-8"?>
 <a:theme xmlns:a="http://schemas.openxmlformats.org/drawingml/2006/main" name="Badge">
   <a:themeElements>

</xml_diff>